<commit_message>
Update Mental Health Chatbot.pptx
</commit_message>
<xml_diff>
--- a/Mental Health Chatbot.pptx
+++ b/Mental Health Chatbot.pptx
@@ -104,6 +104,11 @@
       </a:defRPr>
     </a:lvl9pPr>
   </p:defaultTextStyle>
+  <p:extLst>
+    <p:ext uri="{EFAFB233-063F-42B5-8137-9DF3F51BA10A}">
+      <p15:sldGuideLst xmlns:p15="http://schemas.microsoft.com/office/powerpoint/2012/main"/>
+    </p:ext>
+  </p:extLst>
 </p:presentation>
 </file>
 
@@ -4092,7 +4097,7 @@
         </p:nvSpPr>
         <p:spPr>
           <a:xfrm>
-            <a:off x="7240361" y="6131807"/>
+            <a:off x="591911" y="6211290"/>
             <a:ext cx="4320268" cy="584775"/>
           </a:xfrm>
           <a:prstGeom prst="rect">
@@ -4133,6 +4138,44 @@
               </a:rPr>
               <a:t>Blanche Payton</a:t>
             </a:r>
+          </a:p>
+        </p:txBody>
+      </p:sp>
+      <p:sp>
+        <p:nvSpPr>
+          <p:cNvPr id="4" name="TextBox 3">
+            <a:extLst>
+              <a:ext uri="{FF2B5EF4-FFF2-40B4-BE49-F238E27FC236}">
+                <a16:creationId xmlns:a16="http://schemas.microsoft.com/office/drawing/2014/main" id="{E07B0BDD-0F91-DE56-B8F0-4903CD071FE4}"/>
+              </a:ext>
+            </a:extLst>
+          </p:cNvPr>
+          <p:cNvSpPr txBox="1"/>
+          <p:nvPr/>
+        </p:nvSpPr>
+        <p:spPr>
+          <a:xfrm>
+            <a:off x="6225432" y="5934660"/>
+            <a:ext cx="4810868" cy="923330"/>
+          </a:xfrm>
+          <a:prstGeom prst="rect">
+            <a:avLst/>
+          </a:prstGeom>
+          <a:noFill/>
+        </p:spPr>
+        <p:txBody>
+          <a:bodyPr wrap="square" rtlCol="0">
+            <a:spAutoFit/>
+          </a:bodyPr>
+          <a:lstStyle/>
+          <a:p>
+            <a:r>
+              <a:rPr lang="en-US" dirty="0">
+                <a:hlinkClick r:id="rId5" action="ppaction://hlinkpres?slideindex=1&amp;slidetitle="/>
+              </a:rPr>
+              <a:t>https://github.com/ksu-hmi/AI-Chatbot-for-Mental-Health-Support-and-Medication-Education</a:t>
+            </a:r>
+            <a:endParaRPr lang="en-US" dirty="0"/>
           </a:p>
         </p:txBody>
       </p:sp>

</xml_diff>